<commit_message>
Set Solid Color correctly when it comes from the scheme.
</commit_message>
<xml_diff>
--- a/test/ShapeCrawler.Tests.Unit.xUnit/Resource/autoshape/009_table.pptx
+++ b/test/ShapeCrawler.Tests.Unit.xUnit/Resource/autoshape/009_table.pptx
@@ -119,7 +119,7 @@
 <file path=ppt/charts/chart1.xml><?xml version="1.0" encoding="utf-8"?>
 <c:chartSpace xmlns:c="http://schemas.openxmlformats.org/drawingml/2006/chart" xmlns:a="http://schemas.openxmlformats.org/drawingml/2006/main" xmlns:r="http://schemas.openxmlformats.org/officeDocument/2006/relationships" xmlns:c16r2="http://schemas.microsoft.com/office/drawing/2015/06/chart">
   <c:date1904 val="0"/>
-  <c:lang val="de-DE"/>
+  <c:lang val="en-US"/>
   <c:roundedCorners val="0"/>
   <mc:AlternateContent xmlns:mc="http://schemas.openxmlformats.org/markup-compatibility/2006">
     <mc:Choice xmlns:c14="http://schemas.microsoft.com/office/drawing/2007/8/2/chart" Requires="c14">
@@ -156,7 +156,7 @@
               <a:cs typeface="+mn-cs"/>
             </a:defRPr>
           </a:pPr>
-          <a:endParaRPr lang="en-US"/>
+          <a:endParaRPr lang="en-UY"/>
         </a:p>
       </c:txPr>
     </c:title>
@@ -434,7 +434,7 @@
                 <a:cs typeface="+mn-cs"/>
               </a:defRPr>
             </a:pPr>
-            <a:endParaRPr lang="en-US"/>
+            <a:endParaRPr lang="en-UY"/>
           </a:p>
         </c:txPr>
         <c:crossAx val="947864576"/>
@@ -493,7 +493,7 @@
                 <a:cs typeface="+mn-cs"/>
               </a:defRPr>
             </a:pPr>
-            <a:endParaRPr lang="en-US"/>
+            <a:endParaRPr lang="en-UY"/>
           </a:p>
         </c:txPr>
         <c:crossAx val="947800784"/>
@@ -535,7 +535,7 @@
               <a:cs typeface="+mn-cs"/>
             </a:defRPr>
           </a:pPr>
-          <a:endParaRPr lang="en-US"/>
+          <a:endParaRPr lang="en-UY"/>
         </a:p>
       </c:txPr>
     </c:legend>
@@ -564,7 +564,7 @@
       <a:pPr>
         <a:defRPr/>
       </a:pPr>
-      <a:endParaRPr lang="en-US"/>
+      <a:endParaRPr lang="en-UY"/>
     </a:p>
   </c:txPr>
   <c:externalData r:id="rId3">
@@ -576,7 +576,7 @@
 <file path=ppt/charts/chart2.xml><?xml version="1.0" encoding="utf-8"?>
 <c:chartSpace xmlns:c="http://schemas.openxmlformats.org/drawingml/2006/chart" xmlns:a="http://schemas.openxmlformats.org/drawingml/2006/main" xmlns:r="http://schemas.openxmlformats.org/officeDocument/2006/relationships" xmlns:c16r2="http://schemas.microsoft.com/office/drawing/2015/06/chart">
   <c:date1904 val="0"/>
-  <c:lang val="de-DE"/>
+  <c:lang val="en-US"/>
   <c:roundedCorners val="0"/>
   <mc:AlternateContent xmlns:mc="http://schemas.openxmlformats.org/markup-compatibility/2006">
     <mc:Choice xmlns:c14="http://schemas.microsoft.com/office/drawing/2007/8/2/chart" Requires="c14">
@@ -613,7 +613,7 @@
               <a:cs typeface="+mn-cs"/>
             </a:defRPr>
           </a:pPr>
-          <a:endParaRPr lang="en-US"/>
+          <a:endParaRPr lang="en-UY"/>
         </a:p>
       </c:txPr>
     </c:title>
@@ -809,7 +809,7 @@
               <a:cs typeface="+mn-cs"/>
             </a:defRPr>
           </a:pPr>
-          <a:endParaRPr lang="en-US"/>
+          <a:endParaRPr lang="en-UY"/>
         </a:p>
       </c:txPr>
     </c:legend>
@@ -838,7 +838,7 @@
       <a:pPr>
         <a:defRPr/>
       </a:pPr>
-      <a:endParaRPr lang="en-US"/>
+      <a:endParaRPr lang="en-UY"/>
     </a:p>
   </c:txPr>
   <c:externalData r:id="rId3">
@@ -850,7 +850,7 @@
 <file path=ppt/charts/chart3.xml><?xml version="1.0" encoding="utf-8"?>
 <c:chartSpace xmlns:c="http://schemas.openxmlformats.org/drawingml/2006/chart" xmlns:a="http://schemas.openxmlformats.org/drawingml/2006/main" xmlns:r="http://schemas.openxmlformats.org/officeDocument/2006/relationships" xmlns:c16r2="http://schemas.microsoft.com/office/drawing/2015/06/chart">
   <c:date1904 val="0"/>
-  <c:lang val="de-DE"/>
+  <c:lang val="en-US"/>
   <c:roundedCorners val="0"/>
   <mc:AlternateContent xmlns:mc="http://schemas.openxmlformats.org/markup-compatibility/2006">
     <mc:Choice xmlns:c14="http://schemas.microsoft.com/office/drawing/2007/8/2/chart" Requires="c14">
@@ -899,7 +899,7 @@
               <a:cs typeface="+mn-cs"/>
             </a:defRPr>
           </a:pPr>
-          <a:endParaRPr lang="en-US"/>
+          <a:endParaRPr lang="en-UY"/>
         </a:p>
       </c:txPr>
     </c:title>
@@ -1110,7 +1110,7 @@
               <a:cs typeface="+mn-cs"/>
             </a:defRPr>
           </a:pPr>
-          <a:endParaRPr lang="en-US"/>
+          <a:endParaRPr lang="en-UY"/>
         </a:p>
       </c:txPr>
     </c:legend>
@@ -1139,7 +1139,7 @@
       <a:pPr>
         <a:defRPr/>
       </a:pPr>
-      <a:endParaRPr lang="en-US"/>
+      <a:endParaRPr lang="en-UY"/>
     </a:p>
   </c:txPr>
   <c:externalData r:id="rId4">
@@ -1151,7 +1151,7 @@
 <file path=ppt/charts/chart4.xml><?xml version="1.0" encoding="utf-8"?>
 <c:chartSpace xmlns:c="http://schemas.openxmlformats.org/drawingml/2006/chart" xmlns:a="http://schemas.openxmlformats.org/drawingml/2006/main" xmlns:r="http://schemas.openxmlformats.org/officeDocument/2006/relationships" xmlns:c16r2="http://schemas.microsoft.com/office/drawing/2015/06/chart">
   <c:date1904 val="0"/>
-  <c:lang val="de-DE"/>
+  <c:lang val="en-US"/>
   <c:roundedCorners val="0"/>
   <mc:AlternateContent xmlns:mc="http://schemas.openxmlformats.org/markup-compatibility/2006">
     <mc:Choice xmlns:c14="http://schemas.microsoft.com/office/drawing/2007/8/2/chart" Requires="c14">
@@ -1214,7 +1214,7 @@
               <a:cs typeface="+mn-cs"/>
             </a:defRPr>
           </a:pPr>
-          <a:endParaRPr lang="en-US"/>
+          <a:endParaRPr lang="en-UY"/>
         </a:p>
       </c:txPr>
     </c:title>
@@ -1410,7 +1410,7 @@
               <a:cs typeface="+mn-cs"/>
             </a:defRPr>
           </a:pPr>
-          <a:endParaRPr lang="en-US"/>
+          <a:endParaRPr lang="en-UY"/>
         </a:p>
       </c:txPr>
     </c:legend>
@@ -1441,7 +1441,7 @@
       <a:pPr>
         <a:defRPr/>
       </a:pPr>
-      <a:endParaRPr lang="en-US"/>
+      <a:endParaRPr lang="en-UY"/>
     </a:p>
   </c:txPr>
   <c:externalData r:id="rId3">
@@ -1453,7 +1453,7 @@
 <file path=ppt/charts/chart5.xml><?xml version="1.0" encoding="utf-8"?>
 <c:chartSpace xmlns:c="http://schemas.openxmlformats.org/drawingml/2006/chart" xmlns:a="http://schemas.openxmlformats.org/drawingml/2006/main" xmlns:r="http://schemas.openxmlformats.org/officeDocument/2006/relationships" xmlns:c16r2="http://schemas.microsoft.com/office/drawing/2015/06/chart">
   <c:date1904 val="0"/>
-  <c:lang val="de-DE"/>
+  <c:lang val="en-US"/>
   <c:roundedCorners val="0"/>
   <mc:AlternateContent xmlns:mc="http://schemas.openxmlformats.org/markup-compatibility/2006">
     <mc:Choice xmlns:c14="http://schemas.microsoft.com/office/drawing/2007/8/2/chart" Requires="c14">
@@ -1490,7 +1490,7 @@
               <a:cs typeface="+mn-cs"/>
             </a:defRPr>
           </a:pPr>
-          <a:endParaRPr lang="en-US"/>
+          <a:endParaRPr lang="en-UY"/>
         </a:p>
       </c:txPr>
     </c:title>
@@ -1712,7 +1712,7 @@
               <a:cs typeface="+mn-cs"/>
             </a:defRPr>
           </a:pPr>
-          <a:endParaRPr lang="en-US"/>
+          <a:endParaRPr lang="en-UY"/>
         </a:p>
       </c:txPr>
     </c:legend>
@@ -1743,7 +1743,7 @@
       <a:pPr>
         <a:defRPr/>
       </a:pPr>
-      <a:endParaRPr lang="en-US"/>
+      <a:endParaRPr lang="en-UY"/>
     </a:p>
   </c:txPr>
   <c:externalData r:id="rId3">
@@ -1755,7 +1755,7 @@
 <file path=ppt/charts/chart6.xml><?xml version="1.0" encoding="utf-8"?>
 <c:chartSpace xmlns:c="http://schemas.openxmlformats.org/drawingml/2006/chart" xmlns:a="http://schemas.openxmlformats.org/drawingml/2006/main" xmlns:r="http://schemas.openxmlformats.org/officeDocument/2006/relationships" xmlns:c16r2="http://schemas.microsoft.com/office/drawing/2015/06/chart">
   <c:date1904 val="0"/>
-  <c:lang val="de-DE"/>
+  <c:lang val="en-US"/>
   <c:roundedCorners val="0"/>
   <mc:AlternateContent xmlns:mc="http://schemas.openxmlformats.org/markup-compatibility/2006">
     <mc:Choice xmlns:c14="http://schemas.microsoft.com/office/drawing/2007/8/2/chart" Requires="c14">
@@ -1818,7 +1818,7 @@
               <a:cs typeface="+mn-cs"/>
             </a:defRPr>
           </a:pPr>
-          <a:endParaRPr lang="en-US"/>
+          <a:endParaRPr lang="en-UY"/>
         </a:p>
       </c:txPr>
     </c:title>
@@ -2145,7 +2145,7 @@
       <a:pPr>
         <a:defRPr/>
       </a:pPr>
-      <a:endParaRPr lang="en-US"/>
+      <a:endParaRPr lang="en-UY"/>
     </a:p>
   </c:txPr>
   <c:externalData r:id="rId3">
@@ -8197,7 +8197,7 @@
           <p:nvPr/>
         </p:nvPicPr>
         <p:blipFill>
-          <a:blip r:embed="rId3">
+          <a:blip r:embed="rId2">
             <a:extLst>
               <a:ext uri="{28A0092B-C50C-407E-A947-70E740481C1C}">
                 <a14:useLocalDpi xmlns:a14="http://schemas.microsoft.com/office/drawing/2010/main" val="0"/>
@@ -8246,12 +8246,12 @@
           <a:graphicData uri="http://schemas.openxmlformats.org/presentationml/2006/ole">
             <mc:AlternateContent xmlns:mc="http://schemas.openxmlformats.org/markup-compatibility/2006">
               <mc:Choice xmlns:v="urn:schemas-microsoft-com:vml" Requires="v">
-                <p:oleObj spid="_x0000_s1028" name="Document" r:id="rId4" imgW="5940848" imgH="323743" progId="Word.Document.12">
+                <p:oleObj name="Document" r:id="rId3" imgW="5940848" imgH="323743" progId="Word.Document.12">
                   <p:embed/>
                 </p:oleObj>
               </mc:Choice>
               <mc:Fallback>
-                <p:oleObj name="Document" r:id="rId4" imgW="5940848" imgH="323743" progId="Word.Document.12">
+                <p:oleObj name="Document" r:id="rId3" imgW="5940848" imgH="323743" progId="Word.Document.12">
                   <p:embed/>
                   <p:pic>
                     <p:nvPicPr>
@@ -8262,7 +8262,7 @@
                       <p:nvPr/>
                     </p:nvPicPr>
                     <p:blipFill>
-                      <a:blip r:embed="rId5">
+                      <a:blip r:embed="rId4">
                         <a:extLst>
                           <a:ext uri="{28A0092B-C50C-407E-A947-70E740481C1C}">
                             <a14:useLocalDpi xmlns:a14="http://schemas.microsoft.com/office/drawing/2010/main" val="0"/>
@@ -8351,12 +8351,12 @@
           <a:graphicData uri="http://schemas.openxmlformats.org/presentationml/2006/ole">
             <mc:AlternateContent xmlns:mc="http://schemas.openxmlformats.org/markup-compatibility/2006">
               <mc:Choice xmlns:v="urn:schemas-microsoft-com:vml" Requires="v">
-                <p:oleObj spid="_x0000_s1029" name="Packager Shell Object" showAsIcon="1" r:id="rId6" imgW="485640" imgH="372960" progId="Package">
+                <p:oleObj name="Packager Shell Object" showAsIcon="1" r:id="rId5" imgW="485640" imgH="372960" progId="Package">
                   <p:embed/>
                 </p:oleObj>
               </mc:Choice>
               <mc:Fallback>
-                <p:oleObj name="Packager Shell Object" showAsIcon="1" r:id="rId6" imgW="485640" imgH="372960" progId="Package">
+                <p:oleObj name="Packager Shell Object" showAsIcon="1" r:id="rId5" imgW="485640" imgH="372960" progId="Package">
                   <p:embed/>
                   <p:pic>
                     <p:nvPicPr>
@@ -8371,7 +8371,7 @@
                       <p:nvPr/>
                     </p:nvPicPr>
                     <p:blipFill>
-                      <a:blip r:embed="rId7"/>
+                      <a:blip r:embed="rId6"/>
                       <a:stretch>
                         <a:fillRect/>
                       </a:stretch>
@@ -9138,6 +9138,55 @@
           </a:prstGeom>
         </p:spPr>
       </p:pic>
+      <p:sp>
+        <p:nvSpPr>
+          <p:cNvPr id="4" name="Rectangle 3">
+            <a:extLst>
+              <a:ext uri="{FF2B5EF4-FFF2-40B4-BE49-F238E27FC236}">
+                <a16:creationId xmlns:a16="http://schemas.microsoft.com/office/drawing/2014/main" id="{6F975F6D-C206-DDCF-6ABB-92FBA8732C70}"/>
+              </a:ext>
+            </a:extLst>
+          </p:cNvPr>
+          <p:cNvSpPr/>
+          <p:nvPr/>
+        </p:nvSpPr>
+        <p:spPr>
+          <a:xfrm>
+            <a:off x="4079019" y="2888859"/>
+            <a:ext cx="3053301" cy="1595677"/>
+          </a:xfrm>
+          <a:prstGeom prst="rect">
+            <a:avLst/>
+          </a:prstGeom>
+          <a:solidFill>
+            <a:schemeClr val="accent1"/>
+          </a:solidFill>
+        </p:spPr>
+        <p:style>
+          <a:lnRef idx="2">
+            <a:schemeClr val="accent1">
+              <a:shade val="15000"/>
+            </a:schemeClr>
+          </a:lnRef>
+          <a:fillRef idx="1">
+            <a:schemeClr val="accent1"/>
+          </a:fillRef>
+          <a:effectRef idx="0">
+            <a:schemeClr val="accent1"/>
+          </a:effectRef>
+          <a:fontRef idx="minor">
+            <a:schemeClr val="lt1"/>
+          </a:fontRef>
+        </p:style>
+        <p:txBody>
+          <a:bodyPr rtlCol="0" anchor="ctr"/>
+          <a:lstStyle/>
+          <a:p>
+            <a:pPr algn="ctr"/>
+            <a:endParaRPr lang="en-UY"/>
+          </a:p>
+        </p:txBody>
+      </p:sp>
     </p:spTree>
     <p:extLst>
       <p:ext uri="{BB962C8B-B14F-4D97-AF65-F5344CB8AC3E}">

</xml_diff>

<commit_message>
Added properties for Alpha, Luminance Modulation, and Luminance Offset and Tests
</commit_message>
<xml_diff>
--- a/test/ShapeCrawler.Tests.Unit.xUnit/Resource/autoshape/009_table.pptx
+++ b/test/ShapeCrawler.Tests.Unit.xUnit/Resource/autoshape/009_table.pptx
@@ -9187,6 +9187,211 @@
           </a:p>
         </p:txBody>
       </p:sp>
+      <p:sp>
+        <p:nvSpPr>
+          <p:cNvPr id="7" name="SolidSchemeAlpha">
+            <a:extLst>
+              <a:ext uri="{FF2B5EF4-FFF2-40B4-BE49-F238E27FC236}">
+                <a16:creationId xmlns:a16="http://schemas.microsoft.com/office/drawing/2014/main" id="{A170A595-365E-55E8-BAEE-AE01216A6FF9}"/>
+              </a:ext>
+            </a:extLst>
+          </p:cNvPr>
+          <p:cNvSpPr/>
+          <p:nvPr/>
+        </p:nvSpPr>
+        <p:spPr>
+          <a:xfrm>
+            <a:off x="741459" y="3324294"/>
+            <a:ext cx="3053301" cy="1595677"/>
+          </a:xfrm>
+          <a:prstGeom prst="rect">
+            <a:avLst/>
+          </a:prstGeom>
+          <a:solidFill>
+            <a:schemeClr val="accent1">
+              <a:alpha val="60000"/>
+            </a:schemeClr>
+          </a:solidFill>
+        </p:spPr>
+        <p:style>
+          <a:lnRef idx="2">
+            <a:schemeClr val="accent1">
+              <a:shade val="15000"/>
+            </a:schemeClr>
+          </a:lnRef>
+          <a:fillRef idx="1">
+            <a:schemeClr val="accent1"/>
+          </a:fillRef>
+          <a:effectRef idx="0">
+            <a:schemeClr val="accent1"/>
+          </a:effectRef>
+          <a:fontRef idx="minor">
+            <a:schemeClr val="lt1"/>
+          </a:fontRef>
+        </p:style>
+        <p:txBody>
+          <a:bodyPr rtlCol="0" anchor="ctr"/>
+          <a:lstStyle/>
+          <a:p>
+            <a:pPr algn="ctr"/>
+            <a:endParaRPr lang="en-UY"/>
+          </a:p>
+        </p:txBody>
+      </p:sp>
+      <p:sp>
+        <p:nvSpPr>
+          <p:cNvPr id="8" name="SolidSchemeLumDark">
+            <a:extLst>
+              <a:ext uri="{FF2B5EF4-FFF2-40B4-BE49-F238E27FC236}">
+                <a16:creationId xmlns:a16="http://schemas.microsoft.com/office/drawing/2014/main" id="{8B97F3E0-C890-DC96-241B-1BCF684867B1}"/>
+              </a:ext>
+            </a:extLst>
+          </p:cNvPr>
+          <p:cNvSpPr/>
+          <p:nvPr/>
+        </p:nvSpPr>
+        <p:spPr>
+          <a:xfrm>
+            <a:off x="6877878" y="2049808"/>
+            <a:ext cx="1781092" cy="709295"/>
+          </a:xfrm>
+          <a:prstGeom prst="rect">
+            <a:avLst/>
+          </a:prstGeom>
+          <a:solidFill>
+            <a:schemeClr val="accent1">
+              <a:lumMod val="75000"/>
+            </a:schemeClr>
+          </a:solidFill>
+        </p:spPr>
+        <p:style>
+          <a:lnRef idx="2">
+            <a:schemeClr val="accent1">
+              <a:shade val="15000"/>
+            </a:schemeClr>
+          </a:lnRef>
+          <a:fillRef idx="1">
+            <a:schemeClr val="accent1"/>
+          </a:fillRef>
+          <a:effectRef idx="0">
+            <a:schemeClr val="accent1"/>
+          </a:effectRef>
+          <a:fontRef idx="minor">
+            <a:schemeClr val="lt1"/>
+          </a:fontRef>
+        </p:style>
+        <p:txBody>
+          <a:bodyPr rtlCol="0" anchor="ctr"/>
+          <a:lstStyle/>
+          <a:p>
+            <a:pPr algn="ctr"/>
+            <a:endParaRPr lang="en-UY"/>
+          </a:p>
+        </p:txBody>
+      </p:sp>
+      <p:sp>
+        <p:nvSpPr>
+          <p:cNvPr id="9" name="SolidSchemeLumLight">
+            <a:extLst>
+              <a:ext uri="{FF2B5EF4-FFF2-40B4-BE49-F238E27FC236}">
+                <a16:creationId xmlns:a16="http://schemas.microsoft.com/office/drawing/2014/main" id="{E4DE2004-7A02-ACAF-6306-BC60147D568C}"/>
+              </a:ext>
+            </a:extLst>
+          </p:cNvPr>
+          <p:cNvSpPr/>
+          <p:nvPr/>
+        </p:nvSpPr>
+        <p:spPr>
+          <a:xfrm>
+            <a:off x="7284720" y="3091736"/>
+            <a:ext cx="1781092" cy="709295"/>
+          </a:xfrm>
+          <a:prstGeom prst="rect">
+            <a:avLst/>
+          </a:prstGeom>
+          <a:solidFill>
+            <a:schemeClr val="accent1">
+              <a:lumMod val="20000"/>
+              <a:lumOff val="80000"/>
+            </a:schemeClr>
+          </a:solidFill>
+        </p:spPr>
+        <p:style>
+          <a:lnRef idx="2">
+            <a:schemeClr val="accent1">
+              <a:shade val="15000"/>
+            </a:schemeClr>
+          </a:lnRef>
+          <a:fillRef idx="1">
+            <a:schemeClr val="accent1"/>
+          </a:fillRef>
+          <a:effectRef idx="0">
+            <a:schemeClr val="accent1"/>
+          </a:effectRef>
+          <a:fontRef idx="minor">
+            <a:schemeClr val="lt1"/>
+          </a:fontRef>
+        </p:style>
+        <p:txBody>
+          <a:bodyPr rtlCol="0" anchor="ctr"/>
+          <a:lstStyle/>
+          <a:p>
+            <a:pPr algn="ctr"/>
+            <a:endParaRPr lang="en-UY" dirty="0"/>
+          </a:p>
+        </p:txBody>
+      </p:sp>
+      <p:sp>
+        <p:nvSpPr>
+          <p:cNvPr id="10" name="SolidFillAlpha">
+            <a:extLst>
+              <a:ext uri="{FF2B5EF4-FFF2-40B4-BE49-F238E27FC236}">
+                <a16:creationId xmlns:a16="http://schemas.microsoft.com/office/drawing/2014/main" id="{CC401CA3-9AB5-CEA7-8FE4-049EE05BBC54}"/>
+              </a:ext>
+            </a:extLst>
+          </p:cNvPr>
+          <p:cNvSpPr/>
+          <p:nvPr/>
+        </p:nvSpPr>
+        <p:spPr>
+          <a:xfrm>
+            <a:off x="7132320" y="1565404"/>
+            <a:ext cx="1301099" cy="709295"/>
+          </a:xfrm>
+          <a:prstGeom prst="rect">
+            <a:avLst/>
+          </a:prstGeom>
+          <a:solidFill>
+            <a:srgbClr val="FF0000">
+              <a:alpha val="83137"/>
+            </a:srgbClr>
+          </a:solidFill>
+        </p:spPr>
+        <p:style>
+          <a:lnRef idx="2">
+            <a:schemeClr val="accent1">
+              <a:shade val="15000"/>
+            </a:schemeClr>
+          </a:lnRef>
+          <a:fillRef idx="1">
+            <a:schemeClr val="accent1"/>
+          </a:fillRef>
+          <a:effectRef idx="0">
+            <a:schemeClr val="accent1"/>
+          </a:effectRef>
+          <a:fontRef idx="minor">
+            <a:schemeClr val="lt1"/>
+          </a:fontRef>
+        </p:style>
+        <p:txBody>
+          <a:bodyPr rtlCol="0" anchor="ctr"/>
+          <a:lstStyle/>
+          <a:p>
+            <a:pPr algn="ctr"/>
+            <a:endParaRPr lang="en-UY"/>
+          </a:p>
+        </p:txBody>
+      </p:sp>
     </p:spTree>
     <p:extLst>
       <p:ext uri="{BB962C8B-B14F-4D97-AF65-F5344CB8AC3E}">

</xml_diff>

<commit_message>
Added rotationDegrees to the IShape, it properly gets from the placeholder if necessary, tests added
</commit_message>
<xml_diff>
--- a/test/ShapeCrawler.Tests.Unit.xUnit/Resource/autoshape/009_table.pptx
+++ b/test/ShapeCrawler.Tests.Unit.xUnit/Resource/autoshape/009_table.pptx
@@ -10,6 +10,8 @@
     <p:sldId id="258" r:id="rId4"/>
     <p:sldId id="259" r:id="rId5"/>
     <p:sldId id="260" r:id="rId6"/>
+    <p:sldId id="261" r:id="rId7"/>
+    <p:sldId id="262" r:id="rId8"/>
   </p:sldIdLst>
   <p:sldSz cx="9144000" cy="5143500" type="screen16x9"/>
   <p:notesSz cx="7772400" cy="10058400"/>
@@ -6044,6 +6046,115 @@
 </p:sldLayout>
 </file>
 
+<file path=ppt/slideLayouts/slideLayout13.xml><?xml version="1.0" encoding="utf-8"?>
+<p:sldLayout xmlns:a="http://schemas.openxmlformats.org/drawingml/2006/main" xmlns:r="http://schemas.openxmlformats.org/officeDocument/2006/relationships" xmlns:p="http://schemas.openxmlformats.org/presentationml/2006/main" preserve="1" userDrawn="1">
+  <p:cSld name="Custom Layout">
+    <p:spTree>
+      <p:nvGrpSpPr>
+        <p:cNvPr id="1" name=""/>
+        <p:cNvGrpSpPr/>
+        <p:nvPr/>
+      </p:nvGrpSpPr>
+      <p:grpSpPr>
+        <a:xfrm>
+          <a:off x="0" y="0"/>
+          <a:ext cx="0" cy="0"/>
+          <a:chOff x="0" y="0"/>
+          <a:chExt cx="0" cy="0"/>
+        </a:xfrm>
+      </p:grpSpPr>
+      <p:sp>
+        <p:nvSpPr>
+          <p:cNvPr id="2" name="Title 1">
+            <a:extLst>
+              <a:ext uri="{FF2B5EF4-FFF2-40B4-BE49-F238E27FC236}">
+                <a16:creationId xmlns:a16="http://schemas.microsoft.com/office/drawing/2014/main" id="{D12D1E1A-1928-594C-42AE-4CF5D2E044D1}"/>
+              </a:ext>
+            </a:extLst>
+          </p:cNvPr>
+          <p:cNvSpPr>
+            <a:spLocks noGrp="1"/>
+          </p:cNvSpPr>
+          <p:nvPr>
+            <p:ph type="title"/>
+          </p:nvPr>
+        </p:nvSpPr>
+        <p:spPr>
+          <a:xfrm>
+            <a:off x="628650" y="274638"/>
+            <a:ext cx="7886700" cy="993775"/>
+          </a:xfrm>
+          <a:prstGeom prst="rect">
+            <a:avLst/>
+          </a:prstGeom>
+        </p:spPr>
+        <p:txBody>
+          <a:bodyPr/>
+          <a:lstStyle/>
+          <a:p>
+            <a:r>
+              <a:rPr lang="en-US"/>
+              <a:t>Click to edit Master title style</a:t>
+            </a:r>
+            <a:endParaRPr lang="en-UY"/>
+          </a:p>
+        </p:txBody>
+      </p:sp>
+      <p:sp>
+        <p:nvSpPr>
+          <p:cNvPr id="6" name="Content Placeholder 5">
+            <a:extLst>
+              <a:ext uri="{FF2B5EF4-FFF2-40B4-BE49-F238E27FC236}">
+                <a16:creationId xmlns:a16="http://schemas.microsoft.com/office/drawing/2014/main" id="{0CB250D8-D0A0-5CB6-68F2-36E4CC73C269}"/>
+              </a:ext>
+            </a:extLst>
+          </p:cNvPr>
+          <p:cNvSpPr>
+            <a:spLocks noGrp="1"/>
+          </p:cNvSpPr>
+          <p:nvPr>
+            <p:ph sz="quarter" idx="10" hasCustomPrompt="1"/>
+          </p:nvPr>
+        </p:nvSpPr>
+        <p:spPr>
+          <a:xfrm rot="16918412">
+            <a:off x="7386078" y="2813572"/>
+            <a:ext cx="2594013" cy="505519"/>
+          </a:xfrm>
+          <a:prstGeom prst="rect">
+            <a:avLst/>
+          </a:prstGeom>
+        </p:spPr>
+        <p:txBody>
+          <a:bodyPr/>
+          <a:lstStyle>
+            <a:lvl1pPr marL="0" indent="0">
+              <a:buNone/>
+              <a:defRPr sz="1600"/>
+            </a:lvl1pPr>
+          </a:lstStyle>
+          <a:p>
+            <a:pPr lvl="0"/>
+            <a:r>
+              <a:rPr lang="en-UY" dirty="0"/>
+              <a:t>Testing a lot of text in here</a:t>
+            </a:r>
+          </a:p>
+        </p:txBody>
+      </p:sp>
+    </p:spTree>
+    <p:extLst>
+      <p:ext uri="{BB962C8B-B14F-4D97-AF65-F5344CB8AC3E}">
+        <p14:creationId xmlns:p14="http://schemas.microsoft.com/office/powerpoint/2010/main" val="372064267"/>
+      </p:ext>
+    </p:extLst>
+  </p:cSld>
+  <p:clrMapOvr>
+    <a:masterClrMapping/>
+  </p:clrMapOvr>
+</p:sldLayout>
+</file>
+
 <file path=ppt/slideLayouts/slideLayout2.xml><?xml version="1.0" encoding="utf-8"?>
 <p:sldLayout xmlns:a="http://schemas.openxmlformats.org/drawingml/2006/main" xmlns:r="http://schemas.openxmlformats.org/officeDocument/2006/relationships" xmlns:p="http://schemas.openxmlformats.org/presentationml/2006/main" type="tx" preserve="1">
   <p:cSld name="Title Slide">
@@ -6985,6 +7096,7 @@
     <p:sldLayoutId id="2147483658" r:id="rId10"/>
     <p:sldLayoutId id="2147483659" r:id="rId11"/>
     <p:sldLayoutId id="2147483660" r:id="rId12"/>
+    <p:sldLayoutId id="2147483661" r:id="rId13"/>
   </p:sldLayoutIdLst>
   <p:txStyles>
     <p:titleStyle>
@@ -9521,6 +9633,244 @@
 </p:sld>
 </file>
 
+<file path=ppt/slides/slide6.xml><?xml version="1.0" encoding="utf-8"?>
+<p:sld xmlns:a="http://schemas.openxmlformats.org/drawingml/2006/main" xmlns:r="http://schemas.openxmlformats.org/officeDocument/2006/relationships" xmlns:p="http://schemas.openxmlformats.org/presentationml/2006/main">
+  <p:cSld>
+    <p:spTree>
+      <p:nvGrpSpPr>
+        <p:cNvPr id="1" name=""/>
+        <p:cNvGrpSpPr/>
+        <p:nvPr/>
+      </p:nvGrpSpPr>
+      <p:grpSpPr>
+        <a:xfrm>
+          <a:off x="0" y="0"/>
+          <a:ext cx="0" cy="0"/>
+          <a:chOff x="0" y="0"/>
+          <a:chExt cx="0" cy="0"/>
+        </a:xfrm>
+      </p:grpSpPr>
+      <p:sp>
+        <p:nvSpPr>
+          <p:cNvPr id="2" name="Title 1">
+            <a:extLst>
+              <a:ext uri="{FF2B5EF4-FFF2-40B4-BE49-F238E27FC236}">
+                <a16:creationId xmlns:a16="http://schemas.microsoft.com/office/drawing/2014/main" id="{6DA114D7-AD1D-9CD7-FA24-4F1CBE187590}"/>
+              </a:ext>
+            </a:extLst>
+          </p:cNvPr>
+          <p:cNvSpPr>
+            <a:spLocks noGrp="1"/>
+          </p:cNvSpPr>
+          <p:nvPr>
+            <p:ph type="title"/>
+          </p:nvPr>
+        </p:nvSpPr>
+        <p:spPr/>
+        <p:txBody>
+          <a:bodyPr/>
+          <a:lstStyle/>
+          <a:p>
+            <a:endParaRPr lang="en-UY"/>
+          </a:p>
+        </p:txBody>
+      </p:sp>
+      <p:sp>
+        <p:nvSpPr>
+          <p:cNvPr id="3" name="Subtitle 2">
+            <a:extLst>
+              <a:ext uri="{FF2B5EF4-FFF2-40B4-BE49-F238E27FC236}">
+                <a16:creationId xmlns:a16="http://schemas.microsoft.com/office/drawing/2014/main" id="{8BF6D7A9-C1C9-1B24-0735-7C6DEFDA33FE}"/>
+              </a:ext>
+            </a:extLst>
+          </p:cNvPr>
+          <p:cNvSpPr>
+            <a:spLocks noGrp="1"/>
+          </p:cNvSpPr>
+          <p:nvPr>
+            <p:ph type="subTitle"/>
+          </p:nvPr>
+        </p:nvSpPr>
+        <p:spPr>
+          <a:xfrm>
+            <a:off x="457200" y="1205681"/>
+            <a:ext cx="8229240" cy="858600"/>
+          </a:xfrm>
+        </p:spPr>
+        <p:txBody>
+          <a:bodyPr/>
+          <a:lstStyle/>
+          <a:p>
+            <a:endParaRPr lang="en-UY" dirty="0"/>
+          </a:p>
+        </p:txBody>
+      </p:sp>
+      <p:sp>
+        <p:nvSpPr>
+          <p:cNvPr id="4" name="RotationTextBox">
+            <a:extLst>
+              <a:ext uri="{FF2B5EF4-FFF2-40B4-BE49-F238E27FC236}">
+                <a16:creationId xmlns:a16="http://schemas.microsoft.com/office/drawing/2014/main" id="{55B1ADF2-FB44-434B-E691-BF25A2CF0CFD}"/>
+              </a:ext>
+            </a:extLst>
+          </p:cNvPr>
+          <p:cNvSpPr txBox="1"/>
+          <p:nvPr/>
+        </p:nvSpPr>
+        <p:spPr>
+          <a:xfrm rot="19523953">
+            <a:off x="5315342" y="1884727"/>
+            <a:ext cx="1233954" cy="369332"/>
+          </a:xfrm>
+          <a:prstGeom prst="rect">
+            <a:avLst/>
+          </a:prstGeom>
+          <a:noFill/>
+        </p:spPr>
+        <p:txBody>
+          <a:bodyPr wrap="square" rtlCol="0">
+            <a:spAutoFit/>
+          </a:bodyPr>
+          <a:lstStyle/>
+          <a:p>
+            <a:r>
+              <a:rPr lang="en-UY" dirty="0"/>
+              <a:t>Rotation</a:t>
+            </a:r>
+          </a:p>
+        </p:txBody>
+      </p:sp>
+      <p:sp>
+        <p:nvSpPr>
+          <p:cNvPr id="5" name="NoRotationTextBox">
+            <a:extLst>
+              <a:ext uri="{FF2B5EF4-FFF2-40B4-BE49-F238E27FC236}">
+                <a16:creationId xmlns:a16="http://schemas.microsoft.com/office/drawing/2014/main" id="{9C1207DB-DAF7-0EF4-9DC9-6E0F9B0C3E34}"/>
+              </a:ext>
+            </a:extLst>
+          </p:cNvPr>
+          <p:cNvSpPr txBox="1"/>
+          <p:nvPr/>
+        </p:nvSpPr>
+        <p:spPr>
+          <a:xfrm>
+            <a:off x="2130552" y="3072384"/>
+            <a:ext cx="2075688" cy="369332"/>
+          </a:xfrm>
+          <a:prstGeom prst="rect">
+            <a:avLst/>
+          </a:prstGeom>
+          <a:noFill/>
+        </p:spPr>
+        <p:txBody>
+          <a:bodyPr wrap="square" rtlCol="0">
+            <a:spAutoFit/>
+          </a:bodyPr>
+          <a:lstStyle/>
+          <a:p>
+            <a:r>
+              <a:rPr lang="en-UY" dirty="0"/>
+              <a:t>No Rotation</a:t>
+            </a:r>
+          </a:p>
+        </p:txBody>
+      </p:sp>
+    </p:spTree>
+    <p:extLst>
+      <p:ext uri="{BB962C8B-B14F-4D97-AF65-F5344CB8AC3E}">
+        <p14:creationId xmlns:p14="http://schemas.microsoft.com/office/powerpoint/2010/main" val="1988812609"/>
+      </p:ext>
+    </p:extLst>
+  </p:cSld>
+  <p:clrMapOvr>
+    <a:masterClrMapping/>
+  </p:clrMapOvr>
+</p:sld>
+</file>
+
+<file path=ppt/slides/slide7.xml><?xml version="1.0" encoding="utf-8"?>
+<p:sld xmlns:a="http://schemas.openxmlformats.org/drawingml/2006/main" xmlns:r="http://schemas.openxmlformats.org/officeDocument/2006/relationships" xmlns:p="http://schemas.openxmlformats.org/presentationml/2006/main">
+  <p:cSld>
+    <p:spTree>
+      <p:nvGrpSpPr>
+        <p:cNvPr id="1" name=""/>
+        <p:cNvGrpSpPr/>
+        <p:nvPr/>
+      </p:nvGrpSpPr>
+      <p:grpSpPr>
+        <a:xfrm>
+          <a:off x="0" y="0"/>
+          <a:ext cx="0" cy="0"/>
+          <a:chOff x="0" y="0"/>
+          <a:chExt cx="0" cy="0"/>
+        </a:xfrm>
+      </p:grpSpPr>
+      <p:sp>
+        <p:nvSpPr>
+          <p:cNvPr id="4" name="Title 3">
+            <a:extLst>
+              <a:ext uri="{FF2B5EF4-FFF2-40B4-BE49-F238E27FC236}">
+                <a16:creationId xmlns:a16="http://schemas.microsoft.com/office/drawing/2014/main" id="{642871CD-C71C-453B-AFE7-3C2D9D313D47}"/>
+              </a:ext>
+            </a:extLst>
+          </p:cNvPr>
+          <p:cNvSpPr>
+            <a:spLocks noGrp="1"/>
+          </p:cNvSpPr>
+          <p:nvPr>
+            <p:ph type="title"/>
+          </p:nvPr>
+        </p:nvSpPr>
+        <p:spPr/>
+        <p:txBody>
+          <a:bodyPr/>
+          <a:lstStyle/>
+          <a:p>
+            <a:endParaRPr lang="en-UY"/>
+          </a:p>
+        </p:txBody>
+      </p:sp>
+      <p:sp>
+        <p:nvSpPr>
+          <p:cNvPr id="5" name="VerticalTextPH">
+            <a:extLst>
+              <a:ext uri="{FF2B5EF4-FFF2-40B4-BE49-F238E27FC236}">
+                <a16:creationId xmlns:a16="http://schemas.microsoft.com/office/drawing/2014/main" id="{B20046DA-182A-AC87-8901-BD161E5B2401}"/>
+              </a:ext>
+            </a:extLst>
+          </p:cNvPr>
+          <p:cNvSpPr>
+            <a:spLocks noGrp="1"/>
+          </p:cNvSpPr>
+          <p:nvPr>
+            <p:ph sz="quarter" idx="10"/>
+          </p:nvPr>
+        </p:nvSpPr>
+        <p:spPr/>
+        <p:txBody>
+          <a:bodyPr/>
+          <a:lstStyle/>
+          <a:p>
+            <a:r>
+              <a:rPr lang="en-UY" dirty="0"/>
+              <a:t>Let’s put some text</a:t>
+            </a:r>
+          </a:p>
+        </p:txBody>
+      </p:sp>
+    </p:spTree>
+    <p:extLst>
+      <p:ext uri="{BB962C8B-B14F-4D97-AF65-F5344CB8AC3E}">
+        <p14:creationId xmlns:p14="http://schemas.microsoft.com/office/powerpoint/2010/main" val="1519356853"/>
+      </p:ext>
+    </p:extLst>
+  </p:cSld>
+  <p:clrMapOvr>
+    <a:masterClrMapping/>
+  </p:clrMapOvr>
+</p:sld>
+</file>
+
 <file path=ppt/theme/theme1.xml><?xml version="1.0" encoding="utf-8"?>
 <a:theme xmlns:a="http://schemas.openxmlformats.org/drawingml/2006/main" name="Office Theme">
   <a:themeElements>

</xml_diff>

<commit_message>
fixed to support rotated groups and groups
</commit_message>
<xml_diff>
--- a/test/ShapeCrawler.Tests.Unit.xUnit/Resource/autoshape/009_table.pptx
+++ b/test/ShapeCrawler.Tests.Unit.xUnit/Resource/autoshape/009_table.pptx
@@ -9858,6 +9858,308 @@
           </a:p>
         </p:txBody>
       </p:sp>
+      <p:grpSp>
+        <p:nvGrpSpPr>
+          <p:cNvPr id="7" name="NoRotationGroup">
+            <a:extLst>
+              <a:ext uri="{FF2B5EF4-FFF2-40B4-BE49-F238E27FC236}">
+                <a16:creationId xmlns:a16="http://schemas.microsoft.com/office/drawing/2014/main" id="{04A106B1-F15A-39FE-9181-E8CB6077BE14}"/>
+              </a:ext>
+            </a:extLst>
+          </p:cNvPr>
+          <p:cNvGrpSpPr/>
+          <p:nvPr/>
+        </p:nvGrpSpPr>
+        <p:grpSpPr>
+          <a:xfrm>
+            <a:off x="1160890" y="1908313"/>
+            <a:ext cx="3085106" cy="1482515"/>
+            <a:chOff x="1160890" y="1908313"/>
+            <a:chExt cx="3085106" cy="1482515"/>
+          </a:xfrm>
+        </p:grpSpPr>
+        <p:sp>
+          <p:nvSpPr>
+            <p:cNvPr id="2" name="Rectangle 1">
+              <a:extLst>
+                <a:ext uri="{FF2B5EF4-FFF2-40B4-BE49-F238E27FC236}">
+                  <a16:creationId xmlns:a16="http://schemas.microsoft.com/office/drawing/2014/main" id="{AE6D477A-F80E-338A-DEEA-B57ACABC256F}"/>
+                </a:ext>
+              </a:extLst>
+            </p:cNvPr>
+            <p:cNvSpPr/>
+            <p:nvPr/>
+          </p:nvSpPr>
+          <p:spPr>
+            <a:xfrm>
+              <a:off x="1160890" y="1908313"/>
+              <a:ext cx="1574359" cy="604299"/>
+            </a:xfrm>
+            <a:prstGeom prst="rect">
+              <a:avLst/>
+            </a:prstGeom>
+          </p:spPr>
+          <p:style>
+            <a:lnRef idx="2">
+              <a:schemeClr val="accent1">
+                <a:shade val="15000"/>
+              </a:schemeClr>
+            </a:lnRef>
+            <a:fillRef idx="1">
+              <a:schemeClr val="accent1"/>
+            </a:fillRef>
+            <a:effectRef idx="0">
+              <a:schemeClr val="accent1"/>
+            </a:effectRef>
+            <a:fontRef idx="minor">
+              <a:schemeClr val="lt1"/>
+            </a:fontRef>
+          </p:style>
+          <p:txBody>
+            <a:bodyPr rtlCol="0" anchor="ctr"/>
+            <a:lstStyle/>
+            <a:p>
+              <a:pPr algn="ctr"/>
+              <a:endParaRPr lang="en-UY"/>
+            </a:p>
+          </p:txBody>
+        </p:sp>
+        <p:sp>
+          <p:nvSpPr>
+            <p:cNvPr id="3" name="TextBox 2">
+              <a:extLst>
+                <a:ext uri="{FF2B5EF4-FFF2-40B4-BE49-F238E27FC236}">
+                  <a16:creationId xmlns:a16="http://schemas.microsoft.com/office/drawing/2014/main" id="{DB93E090-245D-ECCE-3D53-A8AC550BC8A8}"/>
+                </a:ext>
+              </a:extLst>
+            </p:cNvPr>
+            <p:cNvSpPr txBox="1"/>
+            <p:nvPr/>
+          </p:nvSpPr>
+          <p:spPr>
+            <a:xfrm>
+              <a:off x="1876508" y="3021496"/>
+              <a:ext cx="1152939" cy="369332"/>
+            </a:xfrm>
+            <a:prstGeom prst="rect">
+              <a:avLst/>
+            </a:prstGeom>
+            <a:noFill/>
+          </p:spPr>
+          <p:txBody>
+            <a:bodyPr wrap="square" rtlCol="0">
+              <a:spAutoFit/>
+            </a:bodyPr>
+            <a:lstStyle/>
+            <a:p>
+              <a:r>
+                <a:rPr lang="en-UY" dirty="0"/>
+                <a:t>asdasd</a:t>
+              </a:r>
+            </a:p>
+          </p:txBody>
+        </p:sp>
+        <p:sp>
+          <p:nvSpPr>
+            <p:cNvPr id="6" name="Smiley Face 5">
+              <a:extLst>
+                <a:ext uri="{FF2B5EF4-FFF2-40B4-BE49-F238E27FC236}">
+                  <a16:creationId xmlns:a16="http://schemas.microsoft.com/office/drawing/2014/main" id="{79A6D9CD-8371-DB67-A884-36DF7BD5920D}"/>
+                </a:ext>
+              </a:extLst>
+            </p:cNvPr>
+            <p:cNvSpPr/>
+            <p:nvPr/>
+          </p:nvSpPr>
+          <p:spPr>
+            <a:xfrm>
+              <a:off x="3291839" y="1979875"/>
+              <a:ext cx="954157" cy="763325"/>
+            </a:xfrm>
+            <a:prstGeom prst="smileyFace">
+              <a:avLst/>
+            </a:prstGeom>
+          </p:spPr>
+          <p:style>
+            <a:lnRef idx="2">
+              <a:schemeClr val="accent1">
+                <a:shade val="15000"/>
+              </a:schemeClr>
+            </a:lnRef>
+            <a:fillRef idx="1">
+              <a:schemeClr val="accent1"/>
+            </a:fillRef>
+            <a:effectRef idx="0">
+              <a:schemeClr val="accent1"/>
+            </a:effectRef>
+            <a:fontRef idx="minor">
+              <a:schemeClr val="lt1"/>
+            </a:fontRef>
+          </p:style>
+          <p:txBody>
+            <a:bodyPr rtlCol="0" anchor="ctr"/>
+            <a:lstStyle/>
+            <a:p>
+              <a:pPr algn="ctr"/>
+              <a:endParaRPr lang="en-UY"/>
+            </a:p>
+          </p:txBody>
+        </p:sp>
+      </p:grpSp>
+      <p:grpSp>
+        <p:nvGrpSpPr>
+          <p:cNvPr id="8" name="RotationGroup">
+            <a:extLst>
+              <a:ext uri="{FF2B5EF4-FFF2-40B4-BE49-F238E27FC236}">
+                <a16:creationId xmlns:a16="http://schemas.microsoft.com/office/drawing/2014/main" id="{99A1017E-3BE0-231A-4012-81206B131AB8}"/>
+              </a:ext>
+            </a:extLst>
+          </p:cNvPr>
+          <p:cNvGrpSpPr/>
+          <p:nvPr/>
+        </p:nvGrpSpPr>
+        <p:grpSpPr>
+          <a:xfrm rot="3336241">
+            <a:off x="3865092" y="2810521"/>
+            <a:ext cx="3085106" cy="1482515"/>
+            <a:chOff x="1160890" y="1908313"/>
+            <a:chExt cx="3085106" cy="1482515"/>
+          </a:xfrm>
+        </p:grpSpPr>
+        <p:sp>
+          <p:nvSpPr>
+            <p:cNvPr id="9" name="Rectangle 8">
+              <a:extLst>
+                <a:ext uri="{FF2B5EF4-FFF2-40B4-BE49-F238E27FC236}">
+                  <a16:creationId xmlns:a16="http://schemas.microsoft.com/office/drawing/2014/main" id="{84B50D52-CA01-CD25-B6A0-789B0BE3C95A}"/>
+                </a:ext>
+              </a:extLst>
+            </p:cNvPr>
+            <p:cNvSpPr/>
+            <p:nvPr/>
+          </p:nvSpPr>
+          <p:spPr>
+            <a:xfrm>
+              <a:off x="1160890" y="1908313"/>
+              <a:ext cx="1574359" cy="604299"/>
+            </a:xfrm>
+            <a:prstGeom prst="rect">
+              <a:avLst/>
+            </a:prstGeom>
+            <a:solidFill>
+              <a:srgbClr val="00B050"/>
+            </a:solidFill>
+          </p:spPr>
+          <p:style>
+            <a:lnRef idx="2">
+              <a:schemeClr val="accent1">
+                <a:shade val="15000"/>
+              </a:schemeClr>
+            </a:lnRef>
+            <a:fillRef idx="1">
+              <a:schemeClr val="accent1"/>
+            </a:fillRef>
+            <a:effectRef idx="0">
+              <a:schemeClr val="accent1"/>
+            </a:effectRef>
+            <a:fontRef idx="minor">
+              <a:schemeClr val="lt1"/>
+            </a:fontRef>
+          </p:style>
+          <p:txBody>
+            <a:bodyPr rtlCol="0" anchor="ctr"/>
+            <a:lstStyle/>
+            <a:p>
+              <a:pPr algn="ctr"/>
+              <a:endParaRPr lang="en-UY"/>
+            </a:p>
+          </p:txBody>
+        </p:sp>
+        <p:sp>
+          <p:nvSpPr>
+            <p:cNvPr id="10" name="TextBox 9">
+              <a:extLst>
+                <a:ext uri="{FF2B5EF4-FFF2-40B4-BE49-F238E27FC236}">
+                  <a16:creationId xmlns:a16="http://schemas.microsoft.com/office/drawing/2014/main" id="{B6566649-125F-3AF0-FCA3-16230E0C6E08}"/>
+                </a:ext>
+              </a:extLst>
+            </p:cNvPr>
+            <p:cNvSpPr txBox="1"/>
+            <p:nvPr/>
+          </p:nvSpPr>
+          <p:spPr>
+            <a:xfrm>
+              <a:off x="1876508" y="3021496"/>
+              <a:ext cx="1152939" cy="369332"/>
+            </a:xfrm>
+            <a:prstGeom prst="rect">
+              <a:avLst/>
+            </a:prstGeom>
+            <a:noFill/>
+          </p:spPr>
+          <p:txBody>
+            <a:bodyPr wrap="square" rtlCol="0">
+              <a:spAutoFit/>
+            </a:bodyPr>
+            <a:lstStyle/>
+            <a:p>
+              <a:r>
+                <a:rPr lang="en-UY" dirty="0"/>
+                <a:t>asdasd</a:t>
+              </a:r>
+            </a:p>
+          </p:txBody>
+        </p:sp>
+        <p:sp>
+          <p:nvSpPr>
+            <p:cNvPr id="11" name="Smiley Face 10">
+              <a:extLst>
+                <a:ext uri="{FF2B5EF4-FFF2-40B4-BE49-F238E27FC236}">
+                  <a16:creationId xmlns:a16="http://schemas.microsoft.com/office/drawing/2014/main" id="{0988BD7B-37C3-6660-B5CD-7D55A93A0CA5}"/>
+                </a:ext>
+              </a:extLst>
+            </p:cNvPr>
+            <p:cNvSpPr/>
+            <p:nvPr/>
+          </p:nvSpPr>
+          <p:spPr>
+            <a:xfrm>
+              <a:off x="3291839" y="1979875"/>
+              <a:ext cx="954157" cy="763325"/>
+            </a:xfrm>
+            <a:prstGeom prst="smileyFace">
+              <a:avLst/>
+            </a:prstGeom>
+            <a:solidFill>
+              <a:srgbClr val="00B050"/>
+            </a:solidFill>
+          </p:spPr>
+          <p:style>
+            <a:lnRef idx="2">
+              <a:schemeClr val="accent1">
+                <a:shade val="15000"/>
+              </a:schemeClr>
+            </a:lnRef>
+            <a:fillRef idx="1">
+              <a:schemeClr val="accent1"/>
+            </a:fillRef>
+            <a:effectRef idx="0">
+              <a:schemeClr val="accent1"/>
+            </a:effectRef>
+            <a:fontRef idx="minor">
+              <a:schemeClr val="lt1"/>
+            </a:fontRef>
+          </p:style>
+          <p:txBody>
+            <a:bodyPr rtlCol="0" anchor="ctr"/>
+            <a:lstStyle/>
+            <a:p>
+              <a:pPr algn="ctr"/>
+              <a:endParaRPr lang="en-UY"/>
+            </a:p>
+          </p:txBody>
+        </p:sp>
+      </p:grpSp>
     </p:spTree>
     <p:extLst>
       <p:ext uri="{BB962C8B-B14F-4D97-AF65-F5344CB8AC3E}">

</xml_diff>

<commit_message>
fix tests and names, also fixed ShapeTests file to use NUnit
</commit_message>
<xml_diff>
--- a/test/ShapeCrawler.Tests.Unit.xUnit/Resource/autoshape/009_table.pptx
+++ b/test/ShapeCrawler.Tests.Unit.xUnit/Resource/autoshape/009_table.pptx
@@ -10,8 +10,6 @@
     <p:sldId id="258" r:id="rId4"/>
     <p:sldId id="259" r:id="rId5"/>
     <p:sldId id="260" r:id="rId6"/>
-    <p:sldId id="261" r:id="rId7"/>
-    <p:sldId id="262" r:id="rId8"/>
   </p:sldIdLst>
   <p:sldSz cx="9144000" cy="5143500" type="screen16x9"/>
   <p:notesSz cx="7772400" cy="10058400"/>
@@ -9633,546 +9631,6 @@
 </p:sld>
 </file>
 
-<file path=ppt/slides/slide6.xml><?xml version="1.0" encoding="utf-8"?>
-<p:sld xmlns:a="http://schemas.openxmlformats.org/drawingml/2006/main" xmlns:r="http://schemas.openxmlformats.org/officeDocument/2006/relationships" xmlns:p="http://schemas.openxmlformats.org/presentationml/2006/main">
-  <p:cSld>
-    <p:spTree>
-      <p:nvGrpSpPr>
-        <p:cNvPr id="1" name=""/>
-        <p:cNvGrpSpPr/>
-        <p:nvPr/>
-      </p:nvGrpSpPr>
-      <p:grpSpPr>
-        <a:xfrm>
-          <a:off x="0" y="0"/>
-          <a:ext cx="0" cy="0"/>
-          <a:chOff x="0" y="0"/>
-          <a:chExt cx="0" cy="0"/>
-        </a:xfrm>
-      </p:grpSpPr>
-      <p:sp>
-        <p:nvSpPr>
-          <p:cNvPr id="2" name="Title 1">
-            <a:extLst>
-              <a:ext uri="{FF2B5EF4-FFF2-40B4-BE49-F238E27FC236}">
-                <a16:creationId xmlns:a16="http://schemas.microsoft.com/office/drawing/2014/main" id="{6DA114D7-AD1D-9CD7-FA24-4F1CBE187590}"/>
-              </a:ext>
-            </a:extLst>
-          </p:cNvPr>
-          <p:cNvSpPr>
-            <a:spLocks noGrp="1"/>
-          </p:cNvSpPr>
-          <p:nvPr>
-            <p:ph type="title"/>
-          </p:nvPr>
-        </p:nvSpPr>
-        <p:spPr/>
-        <p:txBody>
-          <a:bodyPr/>
-          <a:lstStyle/>
-          <a:p>
-            <a:endParaRPr lang="en-UY"/>
-          </a:p>
-        </p:txBody>
-      </p:sp>
-      <p:sp>
-        <p:nvSpPr>
-          <p:cNvPr id="3" name="Subtitle 2">
-            <a:extLst>
-              <a:ext uri="{FF2B5EF4-FFF2-40B4-BE49-F238E27FC236}">
-                <a16:creationId xmlns:a16="http://schemas.microsoft.com/office/drawing/2014/main" id="{8BF6D7A9-C1C9-1B24-0735-7C6DEFDA33FE}"/>
-              </a:ext>
-            </a:extLst>
-          </p:cNvPr>
-          <p:cNvSpPr>
-            <a:spLocks noGrp="1"/>
-          </p:cNvSpPr>
-          <p:nvPr>
-            <p:ph type="subTitle"/>
-          </p:nvPr>
-        </p:nvSpPr>
-        <p:spPr>
-          <a:xfrm>
-            <a:off x="457200" y="1205681"/>
-            <a:ext cx="8229240" cy="858600"/>
-          </a:xfrm>
-        </p:spPr>
-        <p:txBody>
-          <a:bodyPr/>
-          <a:lstStyle/>
-          <a:p>
-            <a:endParaRPr lang="en-UY" dirty="0"/>
-          </a:p>
-        </p:txBody>
-      </p:sp>
-      <p:sp>
-        <p:nvSpPr>
-          <p:cNvPr id="4" name="RotationTextBox">
-            <a:extLst>
-              <a:ext uri="{FF2B5EF4-FFF2-40B4-BE49-F238E27FC236}">
-                <a16:creationId xmlns:a16="http://schemas.microsoft.com/office/drawing/2014/main" id="{55B1ADF2-FB44-434B-E691-BF25A2CF0CFD}"/>
-              </a:ext>
-            </a:extLst>
-          </p:cNvPr>
-          <p:cNvSpPr txBox="1"/>
-          <p:nvPr/>
-        </p:nvSpPr>
-        <p:spPr>
-          <a:xfrm rot="19523953">
-            <a:off x="5315342" y="1884727"/>
-            <a:ext cx="1233954" cy="369332"/>
-          </a:xfrm>
-          <a:prstGeom prst="rect">
-            <a:avLst/>
-          </a:prstGeom>
-          <a:noFill/>
-        </p:spPr>
-        <p:txBody>
-          <a:bodyPr wrap="square" rtlCol="0">
-            <a:spAutoFit/>
-          </a:bodyPr>
-          <a:lstStyle/>
-          <a:p>
-            <a:r>
-              <a:rPr lang="en-UY" dirty="0"/>
-              <a:t>Rotation</a:t>
-            </a:r>
-          </a:p>
-        </p:txBody>
-      </p:sp>
-      <p:sp>
-        <p:nvSpPr>
-          <p:cNvPr id="5" name="NoRotationTextBox">
-            <a:extLst>
-              <a:ext uri="{FF2B5EF4-FFF2-40B4-BE49-F238E27FC236}">
-                <a16:creationId xmlns:a16="http://schemas.microsoft.com/office/drawing/2014/main" id="{9C1207DB-DAF7-0EF4-9DC9-6E0F9B0C3E34}"/>
-              </a:ext>
-            </a:extLst>
-          </p:cNvPr>
-          <p:cNvSpPr txBox="1"/>
-          <p:nvPr/>
-        </p:nvSpPr>
-        <p:spPr>
-          <a:xfrm>
-            <a:off x="2130552" y="3072384"/>
-            <a:ext cx="2075688" cy="369332"/>
-          </a:xfrm>
-          <a:prstGeom prst="rect">
-            <a:avLst/>
-          </a:prstGeom>
-          <a:noFill/>
-        </p:spPr>
-        <p:txBody>
-          <a:bodyPr wrap="square" rtlCol="0">
-            <a:spAutoFit/>
-          </a:bodyPr>
-          <a:lstStyle/>
-          <a:p>
-            <a:r>
-              <a:rPr lang="en-UY" dirty="0"/>
-              <a:t>No Rotation</a:t>
-            </a:r>
-          </a:p>
-        </p:txBody>
-      </p:sp>
-    </p:spTree>
-    <p:extLst>
-      <p:ext uri="{BB962C8B-B14F-4D97-AF65-F5344CB8AC3E}">
-        <p14:creationId xmlns:p14="http://schemas.microsoft.com/office/powerpoint/2010/main" val="1988812609"/>
-      </p:ext>
-    </p:extLst>
-  </p:cSld>
-  <p:clrMapOvr>
-    <a:masterClrMapping/>
-  </p:clrMapOvr>
-</p:sld>
-</file>
-
-<file path=ppt/slides/slide7.xml><?xml version="1.0" encoding="utf-8"?>
-<p:sld xmlns:a="http://schemas.openxmlformats.org/drawingml/2006/main" xmlns:r="http://schemas.openxmlformats.org/officeDocument/2006/relationships" xmlns:p="http://schemas.openxmlformats.org/presentationml/2006/main">
-  <p:cSld>
-    <p:spTree>
-      <p:nvGrpSpPr>
-        <p:cNvPr id="1" name=""/>
-        <p:cNvGrpSpPr/>
-        <p:nvPr/>
-      </p:nvGrpSpPr>
-      <p:grpSpPr>
-        <a:xfrm>
-          <a:off x="0" y="0"/>
-          <a:ext cx="0" cy="0"/>
-          <a:chOff x="0" y="0"/>
-          <a:chExt cx="0" cy="0"/>
-        </a:xfrm>
-      </p:grpSpPr>
-      <p:sp>
-        <p:nvSpPr>
-          <p:cNvPr id="4" name="Title 3">
-            <a:extLst>
-              <a:ext uri="{FF2B5EF4-FFF2-40B4-BE49-F238E27FC236}">
-                <a16:creationId xmlns:a16="http://schemas.microsoft.com/office/drawing/2014/main" id="{642871CD-C71C-453B-AFE7-3C2D9D313D47}"/>
-              </a:ext>
-            </a:extLst>
-          </p:cNvPr>
-          <p:cNvSpPr>
-            <a:spLocks noGrp="1"/>
-          </p:cNvSpPr>
-          <p:nvPr>
-            <p:ph type="title"/>
-          </p:nvPr>
-        </p:nvSpPr>
-        <p:spPr/>
-        <p:txBody>
-          <a:bodyPr/>
-          <a:lstStyle/>
-          <a:p>
-            <a:endParaRPr lang="en-UY"/>
-          </a:p>
-        </p:txBody>
-      </p:sp>
-      <p:sp>
-        <p:nvSpPr>
-          <p:cNvPr id="5" name="VerticalTextPH">
-            <a:extLst>
-              <a:ext uri="{FF2B5EF4-FFF2-40B4-BE49-F238E27FC236}">
-                <a16:creationId xmlns:a16="http://schemas.microsoft.com/office/drawing/2014/main" id="{B20046DA-182A-AC87-8901-BD161E5B2401}"/>
-              </a:ext>
-            </a:extLst>
-          </p:cNvPr>
-          <p:cNvSpPr>
-            <a:spLocks noGrp="1"/>
-          </p:cNvSpPr>
-          <p:nvPr>
-            <p:ph sz="quarter" idx="10"/>
-          </p:nvPr>
-        </p:nvSpPr>
-        <p:spPr/>
-        <p:txBody>
-          <a:bodyPr/>
-          <a:lstStyle/>
-          <a:p>
-            <a:r>
-              <a:rPr lang="en-UY" dirty="0"/>
-              <a:t>Let’s put some text</a:t>
-            </a:r>
-          </a:p>
-        </p:txBody>
-      </p:sp>
-      <p:grpSp>
-        <p:nvGrpSpPr>
-          <p:cNvPr id="7" name="NoRotationGroup">
-            <a:extLst>
-              <a:ext uri="{FF2B5EF4-FFF2-40B4-BE49-F238E27FC236}">
-                <a16:creationId xmlns:a16="http://schemas.microsoft.com/office/drawing/2014/main" id="{04A106B1-F15A-39FE-9181-E8CB6077BE14}"/>
-              </a:ext>
-            </a:extLst>
-          </p:cNvPr>
-          <p:cNvGrpSpPr/>
-          <p:nvPr/>
-        </p:nvGrpSpPr>
-        <p:grpSpPr>
-          <a:xfrm>
-            <a:off x="1160890" y="1908313"/>
-            <a:ext cx="3085106" cy="1482515"/>
-            <a:chOff x="1160890" y="1908313"/>
-            <a:chExt cx="3085106" cy="1482515"/>
-          </a:xfrm>
-        </p:grpSpPr>
-        <p:sp>
-          <p:nvSpPr>
-            <p:cNvPr id="2" name="Rectangle 1">
-              <a:extLst>
-                <a:ext uri="{FF2B5EF4-FFF2-40B4-BE49-F238E27FC236}">
-                  <a16:creationId xmlns:a16="http://schemas.microsoft.com/office/drawing/2014/main" id="{AE6D477A-F80E-338A-DEEA-B57ACABC256F}"/>
-                </a:ext>
-              </a:extLst>
-            </p:cNvPr>
-            <p:cNvSpPr/>
-            <p:nvPr/>
-          </p:nvSpPr>
-          <p:spPr>
-            <a:xfrm>
-              <a:off x="1160890" y="1908313"/>
-              <a:ext cx="1574359" cy="604299"/>
-            </a:xfrm>
-            <a:prstGeom prst="rect">
-              <a:avLst/>
-            </a:prstGeom>
-          </p:spPr>
-          <p:style>
-            <a:lnRef idx="2">
-              <a:schemeClr val="accent1">
-                <a:shade val="15000"/>
-              </a:schemeClr>
-            </a:lnRef>
-            <a:fillRef idx="1">
-              <a:schemeClr val="accent1"/>
-            </a:fillRef>
-            <a:effectRef idx="0">
-              <a:schemeClr val="accent1"/>
-            </a:effectRef>
-            <a:fontRef idx="minor">
-              <a:schemeClr val="lt1"/>
-            </a:fontRef>
-          </p:style>
-          <p:txBody>
-            <a:bodyPr rtlCol="0" anchor="ctr"/>
-            <a:lstStyle/>
-            <a:p>
-              <a:pPr algn="ctr"/>
-              <a:endParaRPr lang="en-UY"/>
-            </a:p>
-          </p:txBody>
-        </p:sp>
-        <p:sp>
-          <p:nvSpPr>
-            <p:cNvPr id="3" name="TextBox 2">
-              <a:extLst>
-                <a:ext uri="{FF2B5EF4-FFF2-40B4-BE49-F238E27FC236}">
-                  <a16:creationId xmlns:a16="http://schemas.microsoft.com/office/drawing/2014/main" id="{DB93E090-245D-ECCE-3D53-A8AC550BC8A8}"/>
-                </a:ext>
-              </a:extLst>
-            </p:cNvPr>
-            <p:cNvSpPr txBox="1"/>
-            <p:nvPr/>
-          </p:nvSpPr>
-          <p:spPr>
-            <a:xfrm>
-              <a:off x="1876508" y="3021496"/>
-              <a:ext cx="1152939" cy="369332"/>
-            </a:xfrm>
-            <a:prstGeom prst="rect">
-              <a:avLst/>
-            </a:prstGeom>
-            <a:noFill/>
-          </p:spPr>
-          <p:txBody>
-            <a:bodyPr wrap="square" rtlCol="0">
-              <a:spAutoFit/>
-            </a:bodyPr>
-            <a:lstStyle/>
-            <a:p>
-              <a:r>
-                <a:rPr lang="en-UY" dirty="0"/>
-                <a:t>asdasd</a:t>
-              </a:r>
-            </a:p>
-          </p:txBody>
-        </p:sp>
-        <p:sp>
-          <p:nvSpPr>
-            <p:cNvPr id="6" name="Smiley Face 5">
-              <a:extLst>
-                <a:ext uri="{FF2B5EF4-FFF2-40B4-BE49-F238E27FC236}">
-                  <a16:creationId xmlns:a16="http://schemas.microsoft.com/office/drawing/2014/main" id="{79A6D9CD-8371-DB67-A884-36DF7BD5920D}"/>
-                </a:ext>
-              </a:extLst>
-            </p:cNvPr>
-            <p:cNvSpPr/>
-            <p:nvPr/>
-          </p:nvSpPr>
-          <p:spPr>
-            <a:xfrm>
-              <a:off x="3291839" y="1979875"/>
-              <a:ext cx="954157" cy="763325"/>
-            </a:xfrm>
-            <a:prstGeom prst="smileyFace">
-              <a:avLst/>
-            </a:prstGeom>
-          </p:spPr>
-          <p:style>
-            <a:lnRef idx="2">
-              <a:schemeClr val="accent1">
-                <a:shade val="15000"/>
-              </a:schemeClr>
-            </a:lnRef>
-            <a:fillRef idx="1">
-              <a:schemeClr val="accent1"/>
-            </a:fillRef>
-            <a:effectRef idx="0">
-              <a:schemeClr val="accent1"/>
-            </a:effectRef>
-            <a:fontRef idx="minor">
-              <a:schemeClr val="lt1"/>
-            </a:fontRef>
-          </p:style>
-          <p:txBody>
-            <a:bodyPr rtlCol="0" anchor="ctr"/>
-            <a:lstStyle/>
-            <a:p>
-              <a:pPr algn="ctr"/>
-              <a:endParaRPr lang="en-UY"/>
-            </a:p>
-          </p:txBody>
-        </p:sp>
-      </p:grpSp>
-      <p:grpSp>
-        <p:nvGrpSpPr>
-          <p:cNvPr id="8" name="RotationGroup">
-            <a:extLst>
-              <a:ext uri="{FF2B5EF4-FFF2-40B4-BE49-F238E27FC236}">
-                <a16:creationId xmlns:a16="http://schemas.microsoft.com/office/drawing/2014/main" id="{99A1017E-3BE0-231A-4012-81206B131AB8}"/>
-              </a:ext>
-            </a:extLst>
-          </p:cNvPr>
-          <p:cNvGrpSpPr/>
-          <p:nvPr/>
-        </p:nvGrpSpPr>
-        <p:grpSpPr>
-          <a:xfrm rot="3336241">
-            <a:off x="3865092" y="2810521"/>
-            <a:ext cx="3085106" cy="1482515"/>
-            <a:chOff x="1160890" y="1908313"/>
-            <a:chExt cx="3085106" cy="1482515"/>
-          </a:xfrm>
-        </p:grpSpPr>
-        <p:sp>
-          <p:nvSpPr>
-            <p:cNvPr id="9" name="Rectangle 8">
-              <a:extLst>
-                <a:ext uri="{FF2B5EF4-FFF2-40B4-BE49-F238E27FC236}">
-                  <a16:creationId xmlns:a16="http://schemas.microsoft.com/office/drawing/2014/main" id="{84B50D52-CA01-CD25-B6A0-789B0BE3C95A}"/>
-                </a:ext>
-              </a:extLst>
-            </p:cNvPr>
-            <p:cNvSpPr/>
-            <p:nvPr/>
-          </p:nvSpPr>
-          <p:spPr>
-            <a:xfrm>
-              <a:off x="1160890" y="1908313"/>
-              <a:ext cx="1574359" cy="604299"/>
-            </a:xfrm>
-            <a:prstGeom prst="rect">
-              <a:avLst/>
-            </a:prstGeom>
-            <a:solidFill>
-              <a:srgbClr val="00B050"/>
-            </a:solidFill>
-          </p:spPr>
-          <p:style>
-            <a:lnRef idx="2">
-              <a:schemeClr val="accent1">
-                <a:shade val="15000"/>
-              </a:schemeClr>
-            </a:lnRef>
-            <a:fillRef idx="1">
-              <a:schemeClr val="accent1"/>
-            </a:fillRef>
-            <a:effectRef idx="0">
-              <a:schemeClr val="accent1"/>
-            </a:effectRef>
-            <a:fontRef idx="minor">
-              <a:schemeClr val="lt1"/>
-            </a:fontRef>
-          </p:style>
-          <p:txBody>
-            <a:bodyPr rtlCol="0" anchor="ctr"/>
-            <a:lstStyle/>
-            <a:p>
-              <a:pPr algn="ctr"/>
-              <a:endParaRPr lang="en-UY"/>
-            </a:p>
-          </p:txBody>
-        </p:sp>
-        <p:sp>
-          <p:nvSpPr>
-            <p:cNvPr id="10" name="TextBox 9">
-              <a:extLst>
-                <a:ext uri="{FF2B5EF4-FFF2-40B4-BE49-F238E27FC236}">
-                  <a16:creationId xmlns:a16="http://schemas.microsoft.com/office/drawing/2014/main" id="{B6566649-125F-3AF0-FCA3-16230E0C6E08}"/>
-                </a:ext>
-              </a:extLst>
-            </p:cNvPr>
-            <p:cNvSpPr txBox="1"/>
-            <p:nvPr/>
-          </p:nvSpPr>
-          <p:spPr>
-            <a:xfrm>
-              <a:off x="1876508" y="3021496"/>
-              <a:ext cx="1152939" cy="369332"/>
-            </a:xfrm>
-            <a:prstGeom prst="rect">
-              <a:avLst/>
-            </a:prstGeom>
-            <a:noFill/>
-          </p:spPr>
-          <p:txBody>
-            <a:bodyPr wrap="square" rtlCol="0">
-              <a:spAutoFit/>
-            </a:bodyPr>
-            <a:lstStyle/>
-            <a:p>
-              <a:r>
-                <a:rPr lang="en-UY" dirty="0"/>
-                <a:t>asdasd</a:t>
-              </a:r>
-            </a:p>
-          </p:txBody>
-        </p:sp>
-        <p:sp>
-          <p:nvSpPr>
-            <p:cNvPr id="11" name="Smiley Face 10">
-              <a:extLst>
-                <a:ext uri="{FF2B5EF4-FFF2-40B4-BE49-F238E27FC236}">
-                  <a16:creationId xmlns:a16="http://schemas.microsoft.com/office/drawing/2014/main" id="{0988BD7B-37C3-6660-B5CD-7D55A93A0CA5}"/>
-                </a:ext>
-              </a:extLst>
-            </p:cNvPr>
-            <p:cNvSpPr/>
-            <p:nvPr/>
-          </p:nvSpPr>
-          <p:spPr>
-            <a:xfrm>
-              <a:off x="3291839" y="1979875"/>
-              <a:ext cx="954157" cy="763325"/>
-            </a:xfrm>
-            <a:prstGeom prst="smileyFace">
-              <a:avLst/>
-            </a:prstGeom>
-            <a:solidFill>
-              <a:srgbClr val="00B050"/>
-            </a:solidFill>
-          </p:spPr>
-          <p:style>
-            <a:lnRef idx="2">
-              <a:schemeClr val="accent1">
-                <a:shade val="15000"/>
-              </a:schemeClr>
-            </a:lnRef>
-            <a:fillRef idx="1">
-              <a:schemeClr val="accent1"/>
-            </a:fillRef>
-            <a:effectRef idx="0">
-              <a:schemeClr val="accent1"/>
-            </a:effectRef>
-            <a:fontRef idx="minor">
-              <a:schemeClr val="lt1"/>
-            </a:fontRef>
-          </p:style>
-          <p:txBody>
-            <a:bodyPr rtlCol="0" anchor="ctr"/>
-            <a:lstStyle/>
-            <a:p>
-              <a:pPr algn="ctr"/>
-              <a:endParaRPr lang="en-UY"/>
-            </a:p>
-          </p:txBody>
-        </p:sp>
-      </p:grpSp>
-    </p:spTree>
-    <p:extLst>
-      <p:ext uri="{BB962C8B-B14F-4D97-AF65-F5344CB8AC3E}">
-        <p14:creationId xmlns:p14="http://schemas.microsoft.com/office/powerpoint/2010/main" val="1519356853"/>
-      </p:ext>
-    </p:extLst>
-  </p:cSld>
-  <p:clrMapOvr>
-    <a:masterClrMapping/>
-  </p:clrMapOvr>
-</p:sld>
-</file>
-
 <file path=ppt/theme/theme1.xml><?xml version="1.0" encoding="utf-8"?>
 <a:theme xmlns:a="http://schemas.openxmlformats.org/drawingml/2006/main" name="Office Theme">
   <a:themeElements>

</xml_diff>